<commit_message>
Updated ptx & removed odp
</commit_message>
<xml_diff>
--- a/presentations/street_addresses.pptx
+++ b/presentations/street_addresses.pptx
@@ -517,6 +517,31 @@
           <a:bodyPr/>
           <a:lstStyle/>
           <a:p>
+            <a:r>
+              <a:rPr lang="en-US" dirty="0" smtClean="0"/>
+              <a:t>Hi,</a:t>
+            </a:r>
+            <a:r>
+              <a:rPr lang="en-US" baseline="0" dirty="0" smtClean="0"/>
+              <a:t> my name is Brian Long and the title of my talk today is “Working With Street Addresses” You can also find me at any of these popular hangouts</a:t>
+            </a:r>
+            <a:r>
+              <a:rPr lang="en-US" baseline="0" dirty="0" smtClean="0"/>
+              <a:t>.</a:t>
+            </a:r>
+          </a:p>
+          <a:p>
+            <a:endParaRPr lang="en-US" baseline="0" dirty="0" smtClean="0"/>
+          </a:p>
+          <a:p>
+            <a:r>
+              <a:rPr lang="en-US" baseline="0" dirty="0" smtClean="0"/>
+              <a:t>My company crawls the web reading real estate advertisements. We process millions of street </a:t>
+            </a:r>
+            <a:r>
+              <a:rPr lang="en-US" baseline="0" smtClean="0"/>
+              <a:t>addresses each year.</a:t>
+            </a:r>
             <a:endParaRPr lang="en-US" dirty="0"/>
           </a:p>
         </p:txBody>
@@ -607,8 +632,21 @@
             </a:r>
             <a:r>
               <a:rPr lang="en-US" baseline="0" dirty="0" smtClean="0"/>
-              <a:t> the check digit, here is the full delivery point bar code for Wikipedia. 33701 is the ZIP code, 4313 is the +4 code, and 99 is the delivery point code (indicating a high rise building). </a:t>
-            </a:r>
+              <a:t> the check digit, here is the full delivery point bar code for Wikipedia. 33701 is the ZIP code, 4313 is the +4 code, and </a:t>
+            </a:r>
+            <a:r>
+              <a:rPr lang="en-US" baseline="0" dirty="0" smtClean="0"/>
+              <a:t>00 is </a:t>
+            </a:r>
+            <a:r>
+              <a:rPr lang="en-US" baseline="0" dirty="0" smtClean="0"/>
+              <a:t>the delivery point </a:t>
+            </a:r>
+            <a:r>
+              <a:rPr lang="en-US" baseline="0" dirty="0" smtClean="0"/>
+              <a:t>code. </a:t>
+            </a:r>
+            <a:endParaRPr lang="en-US" baseline="0" dirty="0" smtClean="0"/>
           </a:p>
           <a:p>
             <a:endParaRPr lang="en-US" baseline="0" dirty="0" smtClean="0"/>
@@ -641,7 +679,7 @@
             </a:r>
             <a:r>
               <a:rPr lang="en-US" baseline="0" dirty="0" smtClean="0"/>
-              <a:t>, this is how we can deliver the mail so reliably. Every day, his mail is sorted into a walk sequence based on these codes. All he needs to do is follow the addresses in the order they are sorted in his stack of mail.</a:t>
+              <a:t>, this is how he can deliver the mail so reliably. Every day, his mail is sorted into a walk sequence based on these codes. All he needs to do is follow the addresses in the order they are sorted in his stack of mail.</a:t>
             </a:r>
           </a:p>
           <a:p>
@@ -760,7 +798,15 @@
           <a:p>
             <a:r>
               <a:rPr lang="en-US" baseline="0" dirty="0" smtClean="0"/>
-              <a:t>In my systems, I create an indexed database column for this key and use it for all of our sorting, grouping, and matching operations. It is an extremely fast and accurate way to process addresses.</a:t>
+              <a:t>In my systems, I create an indexed database column for this key and use it for all of our sorting, grouping, and matching operations. It is an extremely fast and accurate way to process </a:t>
+            </a:r>
+            <a:r>
+              <a:rPr lang="en-US" baseline="0" dirty="0" smtClean="0"/>
+              <a:t>street addresses</a:t>
+            </a:r>
+            <a:r>
+              <a:rPr lang="en-US" baseline="0" dirty="0" smtClean="0"/>
+              <a:t>.</a:t>
             </a:r>
           </a:p>
           <a:p>
@@ -769,7 +815,15 @@
           <a:p>
             <a:r>
               <a:rPr lang="en-US" baseline="0" dirty="0" smtClean="0"/>
-              <a:t>The last thing to talk about is how we can get the information required to create the key.</a:t>
+              <a:t>The last thing to talk about is how we </a:t>
+            </a:r>
+            <a:r>
+              <a:rPr lang="en-US" baseline="0" dirty="0" smtClean="0"/>
+              <a:t>get </a:t>
+            </a:r>
+            <a:r>
+              <a:rPr lang="en-US" baseline="0" dirty="0" smtClean="0"/>
+              <a:t>the information required to create the key.</a:t>
             </a:r>
           </a:p>
           <a:p>
@@ -863,38 +917,78 @@
             </a:r>
             <a:r>
               <a:rPr lang="en-US" baseline="0" dirty="0" smtClean="0"/>
-              <a:t> processing data, I call a data hygiene process to standardize the address and return the bar code elements.</a:t>
-            </a:r>
-            <a:endParaRPr lang="en-US" dirty="0" smtClean="0"/>
-          </a:p>
-          <a:p>
-            <a:endParaRPr lang="en-US" dirty="0" smtClean="0"/>
+              <a:t> processing data, </a:t>
+            </a:r>
+            <a:r>
+              <a:rPr lang="en-US" baseline="0" dirty="0" smtClean="0"/>
+              <a:t>use 3</a:t>
+            </a:r>
+            <a:r>
+              <a:rPr lang="en-US" baseline="30000" dirty="0" smtClean="0"/>
+              <a:t>rd</a:t>
+            </a:r>
+            <a:r>
+              <a:rPr lang="en-US" baseline="0" dirty="0" smtClean="0"/>
+              <a:t> party data </a:t>
+            </a:r>
+            <a:r>
+              <a:rPr lang="en-US" baseline="0" dirty="0" smtClean="0"/>
+              <a:t>hygiene </a:t>
+            </a:r>
+            <a:r>
+              <a:rPr lang="en-US" baseline="0" dirty="0" smtClean="0"/>
+              <a:t>software to </a:t>
+            </a:r>
+            <a:r>
+              <a:rPr lang="en-US" baseline="0" dirty="0" smtClean="0"/>
+              <a:t>standardize the </a:t>
+            </a:r>
+            <a:r>
+              <a:rPr lang="en-US" baseline="0" dirty="0" smtClean="0"/>
+              <a:t>address. </a:t>
+            </a:r>
+          </a:p>
+          <a:p>
+            <a:endParaRPr lang="en-US" baseline="0" dirty="0" smtClean="0"/>
           </a:p>
           <a:p>
             <a:r>
               <a:rPr lang="en-US" dirty="0" smtClean="0"/>
-              <a:t>This requires</a:t>
-            </a:r>
-            <a:r>
-              <a:rPr lang="en-US" baseline="0" dirty="0" smtClean="0"/>
-              <a:t> the </a:t>
-            </a:r>
-            <a:r>
-              <a:rPr lang="en-US" dirty="0" smtClean="0"/>
-              <a:t>use</a:t>
-            </a:r>
-            <a:r>
-              <a:rPr lang="en-US" baseline="0" dirty="0" smtClean="0"/>
-              <a:t> of third party software or a cloud service to process your street address data.</a:t>
+              <a:t>For example,</a:t>
+            </a:r>
+            <a:r>
+              <a:rPr lang="en-US" baseline="0" dirty="0" smtClean="0"/>
+              <a:t> this incorrect address for Microsoft will be returned in the proper, standardized, format. The bar code data will be included too.</a:t>
             </a:r>
           </a:p>
           <a:p>
             <a:endParaRPr lang="en-US" baseline="0" dirty="0" smtClean="0"/>
           </a:p>
           <a:p>
-            <a:r>
-              <a:rPr lang="en-US" baseline="0" dirty="0" smtClean="0"/>
-              <a:t>The USPS certifies software vendors who create software that can clean up your data and provide all the bar code elements. You then import the standardized data into your database and build your indexes.</a:t>
+            <a:pPr marL="0" marR="0" indent="0" algn="l" defTabSz="457200" rtl="0" eaLnBrk="1" fontAlgn="auto" latinLnBrk="0" hangingPunct="1">
+              <a:lnSpc>
+                <a:spcPct val="100000"/>
+              </a:lnSpc>
+              <a:spcBef>
+                <a:spcPts val="0"/>
+              </a:spcBef>
+              <a:spcAft>
+                <a:spcPts val="0"/>
+              </a:spcAft>
+              <a:buClrTx/>
+              <a:buSzTx/>
+              <a:buFontTx/>
+              <a:buNone/>
+              <a:tabLst/>
+              <a:defRPr/>
+            </a:pPr>
+            <a:r>
+              <a:rPr lang="en-US" baseline="0" dirty="0" smtClean="0"/>
+              <a:t>The USPS certifies software vendors who create software that can clean up your data and provide all the bar code elements. The software is referred to as CASS certified or just CASS for short</a:t>
+            </a:r>
+            <a:r>
+              <a:rPr lang="en-US" baseline="0" dirty="0" smtClean="0"/>
+              <a:t>. You can find a list of CASS software providers from the USPS or by searching online.</a:t>
             </a:r>
           </a:p>
           <a:p>
@@ -903,14 +997,15 @@
           <a:p>
             <a:r>
               <a:rPr lang="en-US" baseline="0" dirty="0" smtClean="0"/>
-              <a:t>You can find a list of CASS software providers from the USPS or by searching online.</a:t>
+              <a:t>After this step, you </a:t>
+            </a:r>
+            <a:r>
+              <a:rPr lang="en-US" baseline="0" dirty="0" smtClean="0"/>
+              <a:t>then import the standardized data into your database and build your indexes.</a:t>
             </a:r>
           </a:p>
           <a:p>
             <a:endParaRPr lang="en-US" baseline="0" dirty="0" smtClean="0"/>
-          </a:p>
-          <a:p>
-            <a:endParaRPr lang="en-US" dirty="0"/>
           </a:p>
         </p:txBody>
       </p:sp>
@@ -1044,7 +1139,7 @@
           <a:p>
             <a:r>
               <a:rPr lang="en-US" baseline="0" dirty="0" smtClean="0"/>
-              <a:t>I am willing to offer free CASS service for open data projects. I have licensed a CASS software package and can run your files for you if you are working on an open data project.</a:t>
+              <a:t>Also, I am willing to offer free CASS service for open data projects. I have licensed a CASS software package and can run your files for you if you are working on an open data project.</a:t>
             </a:r>
           </a:p>
         </p:txBody>
@@ -1135,7 +1230,7 @@
             </a:r>
             <a:r>
               <a:rPr lang="en-US" baseline="0" dirty="0" smtClean="0"/>
-              <a:t> with street addresses, we often see messy data like this. All of these entries are referring to the same address. However, the data formatting is inconsistent or has typographical errors. This inconsistency leads to problems with sorting, grouping, and searching addresses.</a:t>
+              <a:t> with street addresses, we often see messy data like this. All of these entries are referring to the same address. However, the data formatting is inconsistent or has typographical errors. This inconsistency leads to problems with sorting, grouping, and searching.</a:t>
             </a:r>
           </a:p>
           <a:p>
@@ -1153,7 +1248,15 @@
           <a:p>
             <a:r>
               <a:rPr lang="en-US" baseline="0" dirty="0" smtClean="0"/>
-              <a:t>There is another way to work with street addresses that makes sorting, grouping, and searching quite easy. That story starts with this guy…</a:t>
+              <a:t>Don</a:t>
+            </a:r>
+            <a:r>
+              <a:rPr lang="fr-FR" baseline="0" dirty="0" smtClean="0"/>
+              <a:t>’</a:t>
+            </a:r>
+            <a:r>
+              <a:rPr lang="en-US" baseline="0" dirty="0" smtClean="0"/>
+              <a:t>t’ worry, there is another way to work with street addresses that makes sorting, grouping, and searching quite easy. That story starts with this guy…</a:t>
             </a:r>
           </a:p>
           <a:p>
@@ -1250,15 +1353,7 @@
             </a:r>
             <a:r>
               <a:rPr lang="en-US" baseline="0" dirty="0" smtClean="0"/>
-              <a:t> of us know Cliff </a:t>
-            </a:r>
-            <a:r>
-              <a:rPr lang="en-US" baseline="0" dirty="0" err="1" smtClean="0"/>
-              <a:t>Clavin</a:t>
-            </a:r>
-            <a:r>
-              <a:rPr lang="en-US" baseline="0" dirty="0" smtClean="0"/>
-              <a:t>. He is a great mail man, but he is no computer scientist. He doesn’t know about depth-first searches, breadth-first searches, or shortest-path algorithms. Although we can always find the shortest path to his next beer.</a:t>
+              <a:t> of us know Cliff. He is a great mail man, but he is no computer scientist. He doesn’t know about depth-first searches, breadth-first searches, or shortest-path algorithms. Although he can always find the shortest path to his next beer.</a:t>
             </a:r>
           </a:p>
           <a:p>
@@ -1267,7 +1362,7 @@
           <a:p>
             <a:r>
               <a:rPr lang="en-US" baseline="0" dirty="0" smtClean="0"/>
-              <a:t>Somehow, he delivers the mail reliably every day. Fortunately, Cliff works with some computer scientists and they help Cliff with this…</a:t>
+              <a:t>Somehow, he delivers the mail reliably every day. Fortunately, Cliff does work with some computer scientists and they help Cliff with this…</a:t>
             </a:r>
             <a:endParaRPr lang="en-US" dirty="0"/>
           </a:p>
@@ -1372,6 +1467,74 @@
             </a:pPr>
             <a:r>
               <a:rPr lang="en-US" dirty="0" smtClean="0"/>
+              <a:t>A postal</a:t>
+            </a:r>
+            <a:r>
+              <a:rPr lang="en-US" baseline="0" dirty="0" smtClean="0"/>
+              <a:t> </a:t>
+            </a:r>
+            <a:r>
+              <a:rPr lang="en-US" dirty="0" smtClean="0"/>
+              <a:t>bar </a:t>
+            </a:r>
+            <a:r>
+              <a:rPr lang="en-US" dirty="0" smtClean="0"/>
+              <a:t>code</a:t>
+            </a:r>
+            <a:r>
+              <a:rPr lang="en-US" baseline="0" dirty="0" smtClean="0"/>
+              <a:t> </a:t>
+            </a:r>
+            <a:r>
+              <a:rPr lang="en-US" baseline="0" dirty="0" smtClean="0"/>
+              <a:t>appears </a:t>
+            </a:r>
+            <a:r>
+              <a:rPr lang="en-US" baseline="0" dirty="0" smtClean="0"/>
+              <a:t>on every piece of mail delivered in the US.</a:t>
+            </a:r>
+            <a:endParaRPr lang="en-US" dirty="0" smtClean="0"/>
+          </a:p>
+          <a:p>
+            <a:pPr marL="0" marR="0" indent="0" algn="l" defTabSz="457200" rtl="0" eaLnBrk="1" fontAlgn="auto" latinLnBrk="0" hangingPunct="1">
+              <a:lnSpc>
+                <a:spcPct val="100000"/>
+              </a:lnSpc>
+              <a:spcBef>
+                <a:spcPts val="0"/>
+              </a:spcBef>
+              <a:spcAft>
+                <a:spcPts val="0"/>
+              </a:spcAft>
+              <a:buClrTx/>
+              <a:buSzTx/>
+              <a:buFontTx/>
+              <a:buNone/>
+              <a:tabLst/>
+              <a:defRPr/>
+            </a:pPr>
+            <a:endParaRPr lang="en-US" dirty="0" smtClean="0"/>
+          </a:p>
+          <a:p>
+            <a:pPr marL="0" marR="0" indent="0" algn="l" defTabSz="457200" rtl="0" eaLnBrk="1" fontAlgn="auto" latinLnBrk="0" hangingPunct="1">
+              <a:lnSpc>
+                <a:spcPct val="100000"/>
+              </a:lnSpc>
+              <a:spcBef>
+                <a:spcPts val="0"/>
+              </a:spcBef>
+              <a:spcAft>
+                <a:spcPts val="0"/>
+              </a:spcAft>
+              <a:buClrTx/>
+              <a:buSzTx/>
+              <a:buFontTx/>
+              <a:buNone/>
+              <a:tabLst/>
+              <a:defRPr/>
+            </a:pPr>
+            <a:r>
+              <a:rPr lang="en-US" dirty="0" smtClean="0"/>
               <a:t>Mr. ZIP promoted the use of ZIP codes for the USPS during the 1960s and 1970s.</a:t>
             </a:r>
             <a:r>
@@ -1394,19 +1557,35 @@
           <a:p>
             <a:r>
               <a:rPr lang="en-US" dirty="0" smtClean="0"/>
+              <a:t>The</a:t>
+            </a:r>
+            <a:r>
+              <a:rPr lang="en-US" baseline="0" dirty="0" smtClean="0"/>
+              <a:t> </a:t>
+            </a:r>
+            <a:r>
+              <a:rPr lang="en-US" dirty="0" smtClean="0"/>
               <a:t>POST</a:t>
             </a:r>
             <a:r>
               <a:rPr lang="en-US" baseline="0" dirty="0" smtClean="0"/>
-              <a:t>NET is </a:t>
+              <a:t>NET bar code shown here </a:t>
+            </a:r>
+            <a:r>
+              <a:rPr lang="en-US" baseline="0" dirty="0" smtClean="0"/>
+              <a:t>is </a:t>
             </a:r>
             <a:r>
               <a:rPr lang="en-US" dirty="0" smtClean="0"/>
-              <a:t>an 11 digit barcode, containing the ZIP Code, ZIP+4 Code, and the delivery point code. This is usually referred to as the DPBC, or Delivery Point Bar Code. Placed</a:t>
-            </a:r>
-            <a:r>
-              <a:rPr lang="en-US" baseline="0" dirty="0" smtClean="0"/>
-              <a:t> into use in 2005.</a:t>
+              <a:t>an 11 digit barcode, containing the ZIP Code, ZIP+4 Code, and the delivery point code. Versions</a:t>
+            </a:r>
+            <a:r>
+              <a:rPr lang="en-US" baseline="0" dirty="0" smtClean="0"/>
+              <a:t> of this bar code have been used for decades</a:t>
+            </a:r>
+            <a:r>
+              <a:rPr lang="en-US" baseline="0" dirty="0" smtClean="0"/>
+              <a:t>. There is also a new Intelligent Mail Bar Code that contains additional information about the mailer and the mail piece.</a:t>
             </a:r>
             <a:endParaRPr lang="en-US" dirty="0" smtClean="0"/>
           </a:p>
@@ -1416,25 +1595,31 @@
           <a:p>
             <a:r>
               <a:rPr lang="en-US" dirty="0" smtClean="0"/>
-              <a:t>The information contained</a:t>
-            </a:r>
-            <a:r>
-              <a:rPr lang="en-US" baseline="0" dirty="0" smtClean="0"/>
-              <a:t> in the bar code helps Cliff deliver the mail. It is also key to understand the bar code to efficiently analyze street addresses.</a:t>
-            </a:r>
-            <a:endParaRPr lang="en-US" dirty="0" smtClean="0"/>
-          </a:p>
-          <a:p>
-            <a:endParaRPr lang="en-US" dirty="0" smtClean="0"/>
-          </a:p>
-          <a:p>
+              <a:t>It is the information </a:t>
+            </a:r>
             <a:r>
               <a:rPr lang="en-US" dirty="0" smtClean="0"/>
-              <a:t>The POSTNET bar</a:t>
-            </a:r>
-            <a:r>
-              <a:rPr lang="en-US" baseline="0" dirty="0" smtClean="0"/>
-              <a:t> code was replaced after 2011 with an Intelligent Bar Code. The Intelligent Bar Code includes the POSTNET information + additional information on the Mailer. However, I will focus on the POSTNET code since it has the information we are interested in.</a:t>
+              <a:t>contained</a:t>
+            </a:r>
+            <a:r>
+              <a:rPr lang="en-US" baseline="0" dirty="0" smtClean="0"/>
+              <a:t> in the bar code </a:t>
+            </a:r>
+            <a:r>
+              <a:rPr lang="en-US" baseline="0" dirty="0" smtClean="0"/>
+              <a:t>that helps </a:t>
+            </a:r>
+            <a:r>
+              <a:rPr lang="en-US" baseline="0" dirty="0" smtClean="0"/>
+              <a:t>Cliff deliver the mail. It is also key to understand the bar code to efficiently analyze </a:t>
+            </a:r>
+            <a:r>
+              <a:rPr lang="en-US" baseline="0" dirty="0" smtClean="0"/>
+              <a:t>and process street </a:t>
+            </a:r>
+            <a:r>
+              <a:rPr lang="en-US" baseline="0" dirty="0" smtClean="0"/>
+              <a:t>addresses.</a:t>
             </a:r>
           </a:p>
           <a:p>
@@ -1442,14 +1627,14 @@
           </a:p>
           <a:p>
             <a:r>
-              <a:rPr lang="en-US" dirty="0" smtClean="0"/>
-              <a:t>Check the Wikipedia page if</a:t>
-            </a:r>
-            <a:r>
-              <a:rPr lang="en-US" baseline="0" dirty="0" smtClean="0"/>
-              <a:t> you would like the details on how the long and short bars are constructed. For our discussion, the bar code starts with the zip code + additional information.</a:t>
-            </a:r>
-            <a:endParaRPr lang="en-US" dirty="0" smtClean="0"/>
+              <a:rPr lang="en-US" baseline="0" dirty="0" smtClean="0"/>
+              <a:t>Let’s look at how Zip Codes work</a:t>
+            </a:r>
+            <a:r>
+              <a:rPr lang="en-US" baseline="0" dirty="0" smtClean="0"/>
+              <a:t>…</a:t>
+            </a:r>
+            <a:endParaRPr lang="en-US" baseline="0" dirty="0" smtClean="0"/>
           </a:p>
         </p:txBody>
       </p:sp>
@@ -1535,12 +1720,34 @@
           <a:p>
             <a:r>
               <a:rPr lang="en-US" dirty="0" smtClean="0"/>
-              <a:t>The US is split into zones and these zones form</a:t>
-            </a:r>
-            <a:r>
-              <a:rPr lang="en-US" baseline="0" dirty="0" smtClean="0"/>
-              <a:t> the first 2 or 3 digits of a zip code. The first 3 digits refer to a Sectional Control Facility (SCF)</a:t>
-            </a:r>
+              <a:t>The US is split into zip code zones and these zones form</a:t>
+            </a:r>
+            <a:r>
+              <a:rPr lang="en-US" baseline="0" dirty="0" smtClean="0"/>
+              <a:t> the first 2 or 3 digits of a zip code. </a:t>
+            </a:r>
+            <a:r>
+              <a:rPr lang="en-US" baseline="0" dirty="0" smtClean="0"/>
+              <a:t>Here </a:t>
+            </a:r>
+            <a:r>
+              <a:rPr lang="en-US" baseline="0" dirty="0" smtClean="0"/>
+              <a:t>we can see that Colorado zip codes all start with 80 or 81</a:t>
+            </a:r>
+            <a:r>
+              <a:rPr lang="en-US" baseline="0" dirty="0" smtClean="0"/>
+              <a:t>.</a:t>
+            </a:r>
+          </a:p>
+          <a:p>
+            <a:endParaRPr lang="en-US" baseline="0" dirty="0" smtClean="0"/>
+          </a:p>
+          <a:p>
+            <a:r>
+              <a:rPr lang="en-US" baseline="0" dirty="0" smtClean="0"/>
+              <a:t>The first 3 digits refer to a Sectional Control Facility (SCF) which will be contained within a zip code zone.</a:t>
+            </a:r>
+            <a:endParaRPr lang="en-US" baseline="0" dirty="0" smtClean="0"/>
           </a:p>
           <a:p>
             <a:endParaRPr lang="en-US" baseline="0" dirty="0" smtClean="0"/>
@@ -1636,7 +1843,11 @@
             </a:r>
             <a:r>
               <a:rPr lang="en-US" baseline="0" dirty="0" smtClean="0"/>
-              <a:t> an individual ZIP code.</a:t>
+              <a:t> an individual ZIP code in Boulder</a:t>
+            </a:r>
+            <a:r>
+              <a:rPr lang="en-US" baseline="0" dirty="0" smtClean="0"/>
+              <a:t>. You can see that CU has been excluded from 80301. CU has its own zip codes.</a:t>
             </a:r>
             <a:endParaRPr lang="en-US" dirty="0"/>
           </a:p>
@@ -1724,11 +1935,23 @@
           <a:p>
             <a:r>
               <a:rPr lang="en-US" dirty="0" smtClean="0"/>
-              <a:t>Zip+4 codes were assigned in the 1980s. Within a ZIP code, the USPS assigns</a:t>
-            </a:r>
-            <a:r>
-              <a:rPr lang="en-US" baseline="0" dirty="0" smtClean="0"/>
-              <a:t> a ZIP+4 code to small sections within the ZIP code. Typically, a +4 code is assigned to each side of the street on a block. So, in this photo, the homes on the left would share a 9-digit zip and the homes on the right would share a different 9-digit zip.</a:t>
+              <a:t>Zip+4 codes were assigned in the 1980s. Within a ZIP code, the USPS </a:t>
+            </a:r>
+            <a:r>
+              <a:rPr lang="en-US" dirty="0" smtClean="0"/>
+              <a:t>has assign</a:t>
+            </a:r>
+            <a:r>
+              <a:rPr lang="en-US" baseline="0" dirty="0" smtClean="0"/>
+              <a:t> </a:t>
+            </a:r>
+            <a:r>
+              <a:rPr lang="en-US" baseline="0" dirty="0" smtClean="0"/>
+              <a:t>a ZIP+4 code to small sections within the ZIP code. Typically, a +4 code is assigned to each side of the street on a particular block. So, in this photo, the homes on the left would share a 9-digit zip and the homes on the right would share a different 9-digit zip</a:t>
+            </a:r>
+            <a:r>
+              <a:rPr lang="en-US" baseline="0" dirty="0" smtClean="0"/>
+              <a:t>. There can be thousands of +4 codes within a single zip code.</a:t>
             </a:r>
             <a:endParaRPr lang="en-US" dirty="0"/>
           </a:p>
@@ -1828,7 +2051,15 @@
             </a:r>
             <a:r>
               <a:rPr lang="en-US" baseline="0" dirty="0" smtClean="0"/>
-              <a:t> buildings, the USPS may assign different +4 codes for each floor. So, the residents on a certain floor will usually share the same 9-digit zip code.</a:t>
+              <a:t> buildings, the USPS may assign different +4 codes for each floor. So, the residents on a </a:t>
+            </a:r>
+            <a:r>
+              <a:rPr lang="en-US" baseline="0" dirty="0" smtClean="0"/>
+              <a:t>given floor </a:t>
+            </a:r>
+            <a:r>
+              <a:rPr lang="en-US" baseline="0" dirty="0" smtClean="0"/>
+              <a:t>will usually share the same 9-digit zip code.</a:t>
             </a:r>
             <a:endParaRPr lang="en-US" dirty="0"/>
           </a:p>
@@ -1916,11 +2147,40 @@
           <a:p>
             <a:r>
               <a:rPr lang="en-US" dirty="0" smtClean="0"/>
-              <a:t>To complete</a:t>
-            </a:r>
-            <a:r>
-              <a:rPr lang="en-US" baseline="0" dirty="0" smtClean="0"/>
-              <a:t> the bar code, the USPS will add the last two digits of the house number to the Zip+4 code for a total of eleven digits. In a </a:t>
+              <a:t>Finally,</a:t>
+            </a:r>
+            <a:r>
+              <a:rPr lang="en-US" baseline="0" dirty="0" smtClean="0"/>
+              <a:t> </a:t>
+            </a:r>
+            <a:r>
+              <a:rPr lang="en-US" dirty="0" smtClean="0"/>
+              <a:t>to </a:t>
+            </a:r>
+            <a:r>
+              <a:rPr lang="en-US" dirty="0" smtClean="0"/>
+              <a:t>complete</a:t>
+            </a:r>
+            <a:r>
+              <a:rPr lang="en-US" baseline="0" dirty="0" smtClean="0"/>
+              <a:t> the bar code, the USPS will add the last two digits of the house number to the Zip+4 code for a total of eleven digits. </a:t>
+            </a:r>
+            <a:r>
+              <a:rPr lang="en-US" baseline="0" dirty="0" smtClean="0"/>
+              <a:t>If this is 123 Main Street, the delivery point code will be ‘23’.</a:t>
+            </a:r>
+          </a:p>
+          <a:p>
+            <a:endParaRPr lang="en-US" baseline="0" dirty="0" smtClean="0"/>
+          </a:p>
+          <a:p>
+            <a:r>
+              <a:rPr lang="en-US" baseline="0" dirty="0" smtClean="0"/>
+              <a:t>In </a:t>
+            </a:r>
+            <a:r>
+              <a:rPr lang="en-US" baseline="0" dirty="0" smtClean="0"/>
+              <a:t>a </a:t>
             </a:r>
             <a:r>
               <a:rPr lang="en-US" baseline="0" dirty="0" err="1" smtClean="0"/>
@@ -1928,7 +2188,23 @@
             </a:r>
             <a:r>
               <a:rPr lang="en-US" baseline="0" dirty="0" smtClean="0"/>
-              <a:t> building, the two digit delivery point will commonly be 99 indicating that there are multiple delivery points and unit number is required for final delivery.</a:t>
+              <a:t> building, the two digit delivery point code will </a:t>
+            </a:r>
+            <a:r>
+              <a:rPr lang="en-US" baseline="0" dirty="0" smtClean="0"/>
+              <a:t>be the same for all delivery </a:t>
+            </a:r>
+            <a:r>
+              <a:rPr lang="en-US" baseline="0" dirty="0" smtClean="0"/>
+              <a:t>points </a:t>
+            </a:r>
+            <a:r>
+              <a:rPr lang="en-US" baseline="0" dirty="0" smtClean="0"/>
+              <a:t>in the building and </a:t>
+            </a:r>
+            <a:r>
+              <a:rPr lang="en-US" baseline="0" dirty="0" smtClean="0"/>
+              <a:t>unit number is required for final delivery.</a:t>
             </a:r>
           </a:p>
           <a:p>
@@ -5175,12 +5451,12 @@
           <a:lstStyle/>
           <a:p>
             <a:r>
-              <a:rPr lang="en-US" sz="3200" dirty="0"/>
+              <a:rPr lang="en-US" sz="3200" dirty="0" smtClean="0"/>
               <a:t>33701-4313</a:t>
             </a:r>
             <a:r>
               <a:rPr lang="en-US" sz="3200" dirty="0" smtClean="0"/>
-              <a:t>-99</a:t>
+              <a:t>-00</a:t>
             </a:r>
             <a:endParaRPr lang="en-US" sz="3200" dirty="0"/>
           </a:p>
@@ -5327,7 +5603,7 @@
           <a:p>
             <a:r>
               <a:rPr lang="en-US" sz="3200" dirty="0" smtClean="0"/>
-              <a:t>33701431399UNIT358 </a:t>
+              <a:t>33701431300UNIT358 </a:t>
             </a:r>
             <a:endParaRPr lang="en-US" sz="3200" dirty="0"/>
           </a:p>
@@ -5396,38 +5672,41 @@
             <p:ph idx="1"/>
           </p:nvPr>
         </p:nvSpPr>
-        <p:spPr/>
-        <p:txBody>
-          <a:bodyPr/>
+        <p:spPr>
+          <a:xfrm>
+            <a:off x="457200" y="4005766"/>
+            <a:ext cx="8229600" cy="2124153"/>
+          </a:xfrm>
+        </p:spPr>
+        <p:txBody>
+          <a:bodyPr>
+            <a:normAutofit lnSpcReduction="10000"/>
+          </a:bodyPr>
           <a:lstStyle/>
           <a:p>
             <a:r>
               <a:rPr lang="en-US" dirty="0" smtClean="0"/>
-              <a:t>Coding Accuracy Support Software (CASS)</a:t>
-            </a:r>
-          </a:p>
-          <a:p>
+              <a:t>Coding Accuracy Support Software (CASS</a:t>
+            </a:r>
             <a:r>
               <a:rPr lang="en-US" dirty="0" smtClean="0"/>
-              <a:t>A list of CASS certified software vendors can be obtained from the USPS</a:t>
-            </a:r>
-          </a:p>
-          <a:p>
-            <a:pPr lvl="1"/>
-            <a:r>
-              <a:rPr lang="en-US" sz="2400" dirty="0" smtClean="0">
-                <a:hlinkClick r:id="rId3"/>
-              </a:rPr>
-              <a:t>http://ribbs.usps.gov/files/vendors/cassn01d.TXT</a:t>
-            </a:r>
-            <a:endParaRPr lang="en-US" sz="2400" dirty="0" smtClean="0"/>
+              <a:t>)</a:t>
+            </a:r>
           </a:p>
           <a:p>
             <a:r>
               <a:rPr lang="en-US" dirty="0" smtClean="0"/>
-              <a:t>Also search online for CASS address services.</a:t>
-            </a:r>
-            <a:endParaRPr lang="en-US" dirty="0"/>
+              <a:t>A </a:t>
+            </a:r>
+            <a:r>
+              <a:rPr lang="en-US" dirty="0" smtClean="0"/>
+              <a:t>list of CASS certified software vendors can be obtained from the </a:t>
+            </a:r>
+            <a:r>
+              <a:rPr lang="en-US" dirty="0" smtClean="0"/>
+              <a:t>USPS or by searching online.</a:t>
+            </a:r>
+            <a:endParaRPr lang="en-US" dirty="0" smtClean="0"/>
           </a:p>
         </p:txBody>
       </p:sp>
@@ -5440,7 +5719,7 @@
           <p:nvPr/>
         </p:nvPicPr>
         <p:blipFill>
-          <a:blip r:embed="rId4">
+          <a:blip r:embed="rId3">
             <a:extLst>
               <a:ext uri="{28A0092B-C50C-407E-A947-70E740481C1C}">
                 <a14:useLocalDpi xmlns:a14="http://schemas.microsoft.com/office/drawing/2010/main" val="0"/>
@@ -5461,6 +5740,176 @@
           </a:prstGeom>
         </p:spPr>
       </p:pic>
+      <p:sp>
+        <p:nvSpPr>
+          <p:cNvPr id="5" name="TextBox 4"/>
+          <p:cNvSpPr txBox="1"/>
+          <p:nvPr/>
+        </p:nvSpPr>
+        <p:spPr>
+          <a:xfrm>
+            <a:off x="647255" y="1585190"/>
+            <a:ext cx="7751307" cy="2339102"/>
+          </a:xfrm>
+          <a:prstGeom prst="rect">
+            <a:avLst/>
+          </a:prstGeom>
+          <a:noFill/>
+        </p:spPr>
+        <p:txBody>
+          <a:bodyPr wrap="none" rtlCol="0">
+            <a:spAutoFit/>
+          </a:bodyPr>
+          <a:lstStyle/>
+          <a:p>
+            <a:r>
+              <a:rPr lang="en-US" sz="3200" dirty="0" smtClean="0"/>
+              <a:t>Use 3</a:t>
+            </a:r>
+            <a:r>
+              <a:rPr lang="en-US" sz="3200" baseline="30000" dirty="0" smtClean="0"/>
+              <a:t>rd</a:t>
+            </a:r>
+            <a:r>
+              <a:rPr lang="en-US" sz="3200" dirty="0" smtClean="0"/>
+              <a:t> Party Software to cleanup addresses:</a:t>
+            </a:r>
+          </a:p>
+          <a:p>
+            <a:endParaRPr lang="en-US" sz="3200" dirty="0" smtClean="0"/>
+          </a:p>
+          <a:p>
+            <a:r>
+              <a:rPr lang="en-US" sz="3200" dirty="0" smtClean="0">
+                <a:solidFill>
+                  <a:schemeClr val="bg1">
+                    <a:lumMod val="50000"/>
+                  </a:schemeClr>
+                </a:solidFill>
+              </a:rPr>
+              <a:t>1 </a:t>
+            </a:r>
+            <a:r>
+              <a:rPr lang="en-US" sz="3200" dirty="0" err="1" smtClean="0">
+                <a:solidFill>
+                  <a:schemeClr val="bg1">
+                    <a:lumMod val="50000"/>
+                  </a:schemeClr>
+                </a:solidFill>
+              </a:rPr>
+              <a:t>Microwsoft</a:t>
+            </a:r>
+            <a:r>
+              <a:rPr lang="en-US" sz="3200" dirty="0" smtClean="0">
+                <a:solidFill>
+                  <a:schemeClr val="bg1">
+                    <a:lumMod val="50000"/>
+                  </a:schemeClr>
+                </a:solidFill>
+              </a:rPr>
+              <a:t> Weigh, </a:t>
+            </a:r>
+            <a:r>
+              <a:rPr lang="en-US" sz="3200" dirty="0" err="1">
+                <a:solidFill>
+                  <a:schemeClr val="bg1">
+                    <a:lumMod val="50000"/>
+                  </a:schemeClr>
+                </a:solidFill>
+              </a:rPr>
+              <a:t>Redmund</a:t>
+            </a:r>
+            <a:r>
+              <a:rPr lang="en-US" sz="3200" dirty="0">
+                <a:solidFill>
+                  <a:schemeClr val="bg1">
+                    <a:lumMod val="50000"/>
+                  </a:schemeClr>
+                </a:solidFill>
+              </a:rPr>
+              <a:t>, </a:t>
+            </a:r>
+            <a:r>
+              <a:rPr lang="en-US" sz="3200" dirty="0" smtClean="0">
+                <a:solidFill>
+                  <a:schemeClr val="bg1">
+                    <a:lumMod val="50000"/>
+                  </a:schemeClr>
+                </a:solidFill>
+              </a:rPr>
+              <a:t>WA =&gt;</a:t>
+            </a:r>
+            <a:r>
+              <a:rPr lang="en-US" sz="3200" dirty="0">
+                <a:solidFill>
+                  <a:schemeClr val="bg1">
+                    <a:lumMod val="50000"/>
+                  </a:schemeClr>
+                </a:solidFill>
+              </a:rPr>
+              <a:t/>
+            </a:r>
+            <a:br>
+              <a:rPr lang="en-US" sz="3200" dirty="0">
+                <a:solidFill>
+                  <a:schemeClr val="bg1">
+                    <a:lumMod val="50000"/>
+                  </a:schemeClr>
+                </a:solidFill>
+              </a:rPr>
+            </a:br>
+            <a:r>
+              <a:rPr lang="en-US" sz="3200" dirty="0">
+                <a:solidFill>
+                  <a:schemeClr val="bg1">
+                    <a:lumMod val="50000"/>
+                  </a:schemeClr>
+                </a:solidFill>
+              </a:rPr>
+              <a:t>1 Microsoft Way, Redmond, WA 98052-8300</a:t>
+            </a:r>
+          </a:p>
+          <a:p>
+            <a:endParaRPr lang="en-US" dirty="0"/>
+          </a:p>
+        </p:txBody>
+      </p:sp>
+      <p:sp>
+        <p:nvSpPr>
+          <p:cNvPr id="6" name="TextBox 5"/>
+          <p:cNvSpPr txBox="1"/>
+          <p:nvPr/>
+        </p:nvSpPr>
+        <p:spPr>
+          <a:xfrm>
+            <a:off x="781587" y="6288662"/>
+            <a:ext cx="3801041" cy="523220"/>
+          </a:xfrm>
+          <a:prstGeom prst="rect">
+            <a:avLst/>
+          </a:prstGeom>
+          <a:noFill/>
+        </p:spPr>
+        <p:txBody>
+          <a:bodyPr wrap="none" rtlCol="0">
+            <a:spAutoFit/>
+          </a:bodyPr>
+          <a:lstStyle/>
+          <a:p>
+            <a:pPr marL="0" lvl="1"/>
+            <a:r>
+              <a:rPr lang="en-US" sz="1400" dirty="0">
+                <a:hlinkClick r:id="rId4"/>
+              </a:rPr>
+              <a:t>http://ribbs.usps.gov/files/vendors/cassn01d.TXT</a:t>
+            </a:r>
+            <a:endParaRPr lang="en-US" sz="1400" dirty="0"/>
+          </a:p>
+          <a:p>
+            <a:endParaRPr lang="en-US" sz="1400" dirty="0"/>
+          </a:p>
+        </p:txBody>
+      </p:sp>
     </p:spTree>
     <p:extLst>
       <p:ext uri="{BB962C8B-B14F-4D97-AF65-F5344CB8AC3E}">
@@ -6081,7 +6530,11 @@
           <a:p>
             <a:r>
               <a:rPr lang="en-US" dirty="0" smtClean="0"/>
-              <a:t>POSTNET Barcode</a:t>
+              <a:t>Postal </a:t>
+            </a:r>
+            <a:r>
+              <a:rPr lang="en-US" dirty="0" smtClean="0"/>
+              <a:t>Barcode</a:t>
             </a:r>
             <a:endParaRPr lang="en-US" dirty="0"/>
           </a:p>
@@ -6187,6 +6640,48 @@
           </a:p>
           <a:p>
             <a:endParaRPr lang="en-US" sz="1400" dirty="0"/>
+          </a:p>
+        </p:txBody>
+      </p:sp>
+      <p:sp>
+        <p:nvSpPr>
+          <p:cNvPr id="8" name="TextBox 7"/>
+          <p:cNvSpPr txBox="1"/>
+          <p:nvPr/>
+        </p:nvSpPr>
+        <p:spPr>
+          <a:xfrm>
+            <a:off x="6657391" y="2873533"/>
+            <a:ext cx="2029409" cy="923330"/>
+          </a:xfrm>
+          <a:prstGeom prst="rect">
+            <a:avLst/>
+          </a:prstGeom>
+          <a:noFill/>
+        </p:spPr>
+        <p:txBody>
+          <a:bodyPr wrap="none" rtlCol="0">
+            <a:spAutoFit/>
+          </a:bodyPr>
+          <a:lstStyle/>
+          <a:p>
+            <a:r>
+              <a:rPr lang="en-US" dirty="0" smtClean="0"/>
+              <a:t>ZIP Code</a:t>
+            </a:r>
+          </a:p>
+          <a:p>
+            <a:r>
+              <a:rPr lang="en-US" dirty="0" smtClean="0"/>
+              <a:t>+4 Code</a:t>
+            </a:r>
+          </a:p>
+          <a:p>
+            <a:r>
+              <a:rPr lang="en-US" dirty="0" smtClean="0"/>
+              <a:t>Delivery Point Code</a:t>
+            </a:r>
+            <a:endParaRPr lang="en-US" dirty="0"/>
           </a:p>
         </p:txBody>
       </p:sp>

</xml_diff>